<commit_message>
traversing an external file
</commit_message>
<xml_diff>
--- a/moringa.pptx
+++ b/moringa.pptx
@@ -799,9 +799,8 @@
           <a:bodyPr/>
           <a:lstStyle/>
           <a:p>
-            <a:fld id="{53074F12-AA26-4AC8-9962-C36BB8F32554}" type="datetimeFigureOut">
+            <a:fld id="{4817F7DA-4706-4004-918B-15664B6BFE41}" type="datetime1">
               <a:rPr lang="en-US" smtClean="0"/>
-              <a:pPr/>
               <a:t>3/27/2022</a:t>
             </a:fld>
             <a:endParaRPr lang="en-US"/>
@@ -1053,9 +1052,8 @@
           <a:bodyPr/>
           <a:lstStyle/>
           <a:p>
-            <a:fld id="{53074F12-AA26-4AC8-9962-C36BB8F32554}" type="datetimeFigureOut">
+            <a:fld id="{112C2026-F8F4-47A0-9C97-21AEADDCA938}" type="datetime1">
               <a:rPr lang="en-US" smtClean="0"/>
-              <a:pPr/>
               <a:t>3/27/2022</a:t>
             </a:fld>
             <a:endParaRPr lang="en-US"/>
@@ -1223,9 +1221,8 @@
           <a:bodyPr/>
           <a:lstStyle/>
           <a:p>
-            <a:fld id="{53074F12-AA26-4AC8-9962-C36BB8F32554}" type="datetimeFigureOut">
+            <a:fld id="{D46ABC27-048C-46DC-9FA9-910CACE67B36}" type="datetime1">
               <a:rPr lang="en-US" smtClean="0"/>
-              <a:pPr/>
               <a:t>3/27/2022</a:t>
             </a:fld>
             <a:endParaRPr lang="en-US"/>
@@ -1403,9 +1400,8 @@
           <a:bodyPr/>
           <a:lstStyle/>
           <a:p>
-            <a:fld id="{53074F12-AA26-4AC8-9962-C36BB8F32554}" type="datetimeFigureOut">
+            <a:fld id="{DE6A5D04-060D-4534-B3D2-1E97932D042B}" type="datetime1">
               <a:rPr lang="en-US" smtClean="0"/>
-              <a:pPr/>
               <a:t>3/27/2022</a:t>
             </a:fld>
             <a:endParaRPr lang="en-US"/>
@@ -1685,9 +1681,8 @@
           <a:bodyPr/>
           <a:lstStyle/>
           <a:p>
-            <a:fld id="{53074F12-AA26-4AC8-9962-C36BB8F32554}" type="datetimeFigureOut">
+            <a:fld id="{B654258B-DDAB-4839-9313-69EC072299DF}" type="datetime1">
               <a:rPr lang="en-US" smtClean="0"/>
-              <a:pPr/>
               <a:t>3/27/2022</a:t>
             </a:fld>
             <a:endParaRPr lang="en-US"/>
@@ -1932,9 +1927,8 @@
           <a:bodyPr/>
           <a:lstStyle/>
           <a:p>
-            <a:fld id="{53074F12-AA26-4AC8-9962-C36BB8F32554}" type="datetimeFigureOut">
+            <a:fld id="{B84B93D0-CD94-46DF-8B91-A327958670FD}" type="datetime1">
               <a:rPr lang="en-US" smtClean="0"/>
-              <a:pPr/>
               <a:t>3/27/2022</a:t>
             </a:fld>
             <a:endParaRPr lang="en-US"/>
@@ -2179,9 +2173,8 @@
           <a:bodyPr/>
           <a:lstStyle/>
           <a:p>
-            <a:fld id="{53074F12-AA26-4AC8-9962-C36BB8F32554}" type="datetimeFigureOut">
+            <a:fld id="{1C2F4353-9B84-42AE-A7AC-9F1D040BF6D9}" type="datetime1">
               <a:rPr lang="en-US" smtClean="0"/>
-              <a:pPr/>
               <a:t>3/27/2022</a:t>
             </a:fld>
             <a:endParaRPr lang="en-US"/>
@@ -2466,9 +2459,8 @@
           <a:bodyPr/>
           <a:lstStyle/>
           <a:p>
-            <a:fld id="{53074F12-AA26-4AC8-9962-C36BB8F32554}" type="datetimeFigureOut">
+            <a:fld id="{CF2EA178-7CDE-4D06-8560-DFB18F6D90F6}" type="datetime1">
               <a:rPr lang="en-US" smtClean="0"/>
-              <a:pPr/>
               <a:t>3/27/2022</a:t>
             </a:fld>
             <a:endParaRPr lang="en-US"/>
@@ -2953,9 +2945,8 @@
           <a:bodyPr/>
           <a:lstStyle/>
           <a:p>
-            <a:fld id="{53074F12-AA26-4AC8-9962-C36BB8F32554}" type="datetimeFigureOut">
+            <a:fld id="{7E857E6E-AA15-43C0-B773-CEF243130E32}" type="datetime1">
               <a:rPr lang="en-US" smtClean="0"/>
-              <a:pPr/>
               <a:t>3/27/2022</a:t>
             </a:fld>
             <a:endParaRPr lang="en-US"/>
@@ -3072,9 +3063,8 @@
           <a:bodyPr/>
           <a:lstStyle/>
           <a:p>
-            <a:fld id="{53074F12-AA26-4AC8-9962-C36BB8F32554}" type="datetimeFigureOut">
+            <a:fld id="{5583AA54-6BA2-4E56-80D2-AED471AFF83E}" type="datetime1">
               <a:rPr lang="en-US" smtClean="0"/>
-              <a:pPr/>
               <a:t>3/27/2022</a:t>
             </a:fld>
             <a:endParaRPr lang="en-US"/>
@@ -3169,9 +3159,8 @@
           <a:bodyPr/>
           <a:lstStyle/>
           <a:p>
-            <a:fld id="{53074F12-AA26-4AC8-9962-C36BB8F32554}" type="datetimeFigureOut">
+            <a:fld id="{E0862150-E1C4-4658-9B3D-98D5D4F54D46}" type="datetime1">
               <a:rPr lang="en-US" smtClean="0"/>
-              <a:pPr/>
               <a:t>3/27/2022</a:t>
             </a:fld>
             <a:endParaRPr lang="en-US"/>
@@ -3446,9 +3435,8 @@
           <a:bodyPr/>
           <a:lstStyle/>
           <a:p>
-            <a:fld id="{53074F12-AA26-4AC8-9962-C36BB8F32554}" type="datetimeFigureOut">
+            <a:fld id="{B8F0DB0A-CDF9-48DB-8F7A-13B3AAAD95D4}" type="datetime1">
               <a:rPr lang="en-US" smtClean="0"/>
-              <a:pPr/>
               <a:t>3/27/2022</a:t>
             </a:fld>
             <a:endParaRPr lang="en-US"/>
@@ -3668,9 +3656,8 @@
             </a:lvl1pPr>
           </a:lstStyle>
           <a:p>
-            <a:fld id="{53074F12-AA26-4AC8-9962-C36BB8F32554}" type="datetimeFigureOut">
+            <a:fld id="{D940D3CD-6893-453C-B637-1D1BFE8E726F}" type="datetime1">
               <a:rPr lang="en-US" smtClean="0"/>
-              <a:pPr/>
               <a:t>3/27/2022</a:t>
             </a:fld>
             <a:endParaRPr lang="en-US"/>
@@ -3831,6 +3818,7 @@
     <p:sldLayoutId id="2147483658" r:id="rId11"/>
     <p:sldLayoutId id="2147483659" r:id="rId12"/>
   </p:sldLayoutIdLst>
+  <p:hf sldNum="0" hdr="0" ftr="0" dt="0"/>
   <p:txStyles>
     <p:titleStyle>
       <a:lvl1pPr algn="ctr" defTabSz="914400" rtl="0" eaLnBrk="1" latinLnBrk="0" hangingPunct="1">
@@ -4114,7 +4102,7 @@
         <p:spPr>
           <a:xfrm>
             <a:off x="471949" y="1895168"/>
-            <a:ext cx="8192728" cy="1445337"/>
+            <a:ext cx="8528616" cy="1445337"/>
           </a:xfrm>
         </p:spPr>
         <p:txBody>
@@ -4124,17 +4112,17 @@
           <a:lstStyle/>
           <a:p>
             <a:r>
-              <a:rPr lang="en-US" smtClean="0"/>
+              <a:rPr lang="en-US" sz="3200" dirty="0" smtClean="0"/>
               <a:t>WORKING WITH EXTERNAL</a:t>
             </a:r>
             <a:br>
-              <a:rPr lang="en-US" smtClean="0"/>
+              <a:rPr lang="en-US" sz="3200" dirty="0" smtClean="0"/>
             </a:br>
             <a:r>
-              <a:rPr lang="en-US" smtClean="0"/>
+              <a:rPr lang="en-US" sz="3200" dirty="0" smtClean="0"/>
               <a:t>FILES IN PYTHON</a:t>
             </a:r>
-            <a:endParaRPr lang="en-US" dirty="0"/>
+            <a:endParaRPr lang="en-US" sz="3200" dirty="0"/>
           </a:p>
         </p:txBody>
       </p:sp>
@@ -4158,6 +4146,10 @@
           <a:bodyPr/>
           <a:lstStyle/>
           <a:p>
+            <a:r>
+              <a:rPr lang="en-US" dirty="0" smtClean="0"/>
+              <a:t>BY MR JASTIN MANYA</a:t>
+            </a:r>
             <a:endParaRPr lang="en-US" dirty="0"/>
           </a:p>
         </p:txBody>
@@ -4172,6 +4164,13 @@
   <p:clrMapOvr>
     <a:masterClrMapping/>
   </p:clrMapOvr>
+  <p:timing>
+    <p:tnLst>
+      <p:par>
+        <p:cTn id="1" dur="indefinite" restart="never" nodeType="tmRoot"/>
+      </p:par>
+    </p:tnLst>
+  </p:timing>
 </p:sld>
 </file>
 
@@ -4210,9 +4209,10 @@
           <a:lstStyle/>
           <a:p>
             <a:r>
-              <a:rPr lang="en-US" dirty="0"/>
-              <a:t>Slide Title</a:t>
-            </a:r>
+              <a:rPr lang="en-US" dirty="0" smtClean="0"/>
+              <a:t>INTRODUCTION</a:t>
+            </a:r>
+            <a:endParaRPr lang="en-US" dirty="0"/>
           </a:p>
         </p:txBody>
       </p:sp>
@@ -4226,39 +4226,131 @@
             <p:ph idx="1"/>
           </p:nvPr>
         </p:nvSpPr>
-        <p:spPr/>
-        <p:txBody>
-          <a:bodyPr/>
-          <a:lstStyle/>
-          <a:p>
-            <a:r>
-              <a:rPr lang="en-US" dirty="0"/>
-              <a:t>Make Effective Presentations</a:t>
-            </a:r>
-          </a:p>
-          <a:p>
-            <a:r>
-              <a:rPr lang="en-US" dirty="0"/>
-              <a:t>Using Awesome Backgrounds</a:t>
-            </a:r>
-          </a:p>
-          <a:p>
-            <a:r>
-              <a:rPr lang="en-US" dirty="0"/>
-              <a:t>Engage your Audience</a:t>
-            </a:r>
-          </a:p>
-          <a:p>
-            <a:r>
-              <a:rPr lang="en-US" dirty="0"/>
-              <a:t>Capture Audience Attention</a:t>
-            </a:r>
-          </a:p>
-          <a:p>
-            <a:endParaRPr lang="en-US" dirty="0"/>
-          </a:p>
-          <a:p>
-            <a:endParaRPr lang="en-US" dirty="0"/>
+        <p:spPr>
+          <a:xfrm>
+            <a:off x="1434353" y="2474259"/>
+            <a:ext cx="5862917" cy="2277323"/>
+          </a:xfrm>
+        </p:spPr>
+        <p:txBody>
+          <a:bodyPr>
+            <a:normAutofit/>
+          </a:bodyPr>
+          <a:lstStyle/>
+          <a:p>
+            <a:r>
+              <a:rPr lang="en-US" sz="2000" dirty="0"/>
+              <a:t>Types of external data files </a:t>
+            </a:r>
+          </a:p>
+          <a:p>
+            <a:r>
+              <a:rPr lang="en-US" sz="2000" dirty="0" smtClean="0"/>
+              <a:t> </a:t>
+            </a:r>
+            <a:r>
+              <a:rPr lang="en-US" sz="2000" dirty="0"/>
+              <a:t>Working with .csv, .JSON, SQL and XML</a:t>
+            </a:r>
+            <a:r>
+              <a:rPr lang="en-US" sz="2000" dirty="0" smtClean="0"/>
+              <a:t>.</a:t>
+            </a:r>
+          </a:p>
+          <a:p>
+            <a:r>
+              <a:rPr lang="en-US" sz="2000" dirty="0" smtClean="0"/>
+              <a:t> </a:t>
+            </a:r>
+            <a:r>
+              <a:rPr lang="en-US" sz="2000" dirty="0"/>
+              <a:t>Importing external data </a:t>
+            </a:r>
+            <a:r>
+              <a:rPr lang="en-US" sz="2000" dirty="0" smtClean="0"/>
+              <a:t>files.</a:t>
+            </a:r>
+          </a:p>
+          <a:p>
+            <a:r>
+              <a:rPr lang="en-US" sz="2000" dirty="0" smtClean="0"/>
+              <a:t>Traversing </a:t>
+            </a:r>
+            <a:r>
+              <a:rPr lang="en-US" sz="2000" dirty="0"/>
+              <a:t>through data in external </a:t>
+            </a:r>
+            <a:r>
+              <a:rPr lang="en-US" sz="2000" dirty="0" smtClean="0"/>
+              <a:t>files.</a:t>
+            </a:r>
+          </a:p>
+          <a:p>
+            <a:r>
+              <a:rPr lang="en-US" sz="2000" dirty="0" smtClean="0"/>
+              <a:t>Changing </a:t>
+            </a:r>
+            <a:r>
+              <a:rPr lang="en-US" sz="2000" dirty="0"/>
+              <a:t>data in external </a:t>
+            </a:r>
+            <a:r>
+              <a:rPr lang="en-US" sz="2000" dirty="0" smtClean="0"/>
+              <a:t>files.</a:t>
+            </a:r>
+          </a:p>
+          <a:p>
+            <a:r>
+              <a:rPr lang="en-US" sz="2000" dirty="0" smtClean="0"/>
+              <a:t>CRUD </a:t>
+            </a:r>
+            <a:r>
+              <a:rPr lang="en-US" sz="2000" dirty="0"/>
+              <a:t>functionality on external data files.</a:t>
+            </a:r>
+            <a:endParaRPr lang="en-US" sz="2000" dirty="0" smtClean="0"/>
+          </a:p>
+          <a:p>
+            <a:endParaRPr lang="en-US" sz="2000" dirty="0"/>
+          </a:p>
+        </p:txBody>
+      </p:sp>
+      <p:sp>
+        <p:nvSpPr>
+          <p:cNvPr id="4" name="TextBox 3"/>
+          <p:cNvSpPr txBox="1"/>
+          <p:nvPr/>
+        </p:nvSpPr>
+        <p:spPr>
+          <a:xfrm>
+            <a:off x="3059567" y="1546395"/>
+            <a:ext cx="3424517" cy="369332"/>
+          </a:xfrm>
+          <a:prstGeom prst="rect">
+            <a:avLst/>
+          </a:prstGeom>
+          <a:noFill/>
+        </p:spPr>
+        <p:txBody>
+          <a:bodyPr wrap="square" rtlCol="0">
+            <a:spAutoFit/>
+          </a:bodyPr>
+          <a:lstStyle/>
+          <a:p>
+            <a:pPr algn="ctr"/>
+            <a:r>
+              <a:rPr lang="en-US" dirty="0" smtClean="0">
+                <a:solidFill>
+                  <a:schemeClr val="bg1"/>
+                </a:solidFill>
+              </a:rPr>
+              <a:t>OBJECTIVES</a:t>
+            </a:r>
+            <a:endParaRPr lang="en-US" dirty="0">
+              <a:solidFill>
+                <a:schemeClr val="bg1"/>
+              </a:solidFill>
+            </a:endParaRPr>
           </a:p>
         </p:txBody>
       </p:sp>
@@ -4272,6 +4364,13 @@
   <p:clrMapOvr>
     <a:masterClrMapping/>
   </p:clrMapOvr>
+  <p:timing>
+    <p:tnLst>
+      <p:par>
+        <p:cTn id="1" dur="indefinite" restart="never" nodeType="tmRoot"/>
+      </p:par>
+    </p:tnLst>
+  </p:timing>
 </p:sld>
 </file>
 
@@ -4309,10 +4408,6 @@
           </a:bodyPr>
           <a:lstStyle/>
           <a:p>
-            <a:r>
-              <a:rPr lang="en-US"/>
-              <a:t>Slide Title</a:t>
-            </a:r>
             <a:endParaRPr lang="en-US" dirty="0"/>
           </a:p>
         </p:txBody>
@@ -4367,6 +4462,13 @@
   <p:clrMapOvr>
     <a:masterClrMapping/>
   </p:clrMapOvr>
+  <p:timing>
+    <p:tnLst>
+      <p:par>
+        <p:cTn id="1" dur="indefinite" restart="never" nodeType="tmRoot"/>
+      </p:par>
+    </p:tnLst>
+  </p:timing>
 </p:sld>
 </file>
 
@@ -4535,6 +4637,13 @@
   <p:clrMapOvr>
     <a:masterClrMapping/>
   </p:clrMapOvr>
+  <p:timing>
+    <p:tnLst>
+      <p:par>
+        <p:cTn id="1" dur="indefinite" restart="never" nodeType="tmRoot"/>
+      </p:par>
+    </p:tnLst>
+  </p:timing>
 </p:sld>
 </file>
 
@@ -4555,11 +4664,66 @@
           <a:chExt cx="0" cy="0"/>
         </a:xfrm>
       </p:grpSpPr>
+      <p:sp>
+        <p:nvSpPr>
+          <p:cNvPr id="4" name="TextBox 3"/>
+          <p:cNvSpPr txBox="1"/>
+          <p:nvPr/>
+        </p:nvSpPr>
+        <p:spPr>
+          <a:xfrm>
+            <a:off x="4123763" y="161365"/>
+            <a:ext cx="4500283" cy="1077218"/>
+          </a:xfrm>
+          <a:prstGeom prst="rect">
+            <a:avLst/>
+          </a:prstGeom>
+          <a:noFill/>
+        </p:spPr>
+        <p:txBody>
+          <a:bodyPr wrap="square" rtlCol="0">
+            <a:spAutoFit/>
+          </a:bodyPr>
+          <a:lstStyle/>
+          <a:p>
+            <a:pPr algn="ctr"/>
+            <a:r>
+              <a:rPr lang="en-US" sz="3200" dirty="0">
+                <a:solidFill>
+                  <a:schemeClr val="accent2"/>
+                </a:solidFill>
+              </a:rPr>
+              <a:t>All </a:t>
+            </a:r>
+            <a:r>
+              <a:rPr lang="en-US" sz="3200" dirty="0" smtClean="0">
+                <a:solidFill>
+                  <a:schemeClr val="accent2"/>
+                </a:solidFill>
+              </a:rPr>
+              <a:t>Learning </a:t>
+            </a:r>
+            <a:r>
+              <a:rPr lang="en-US" sz="3200" dirty="0">
+                <a:solidFill>
+                  <a:schemeClr val="accent2"/>
+                </a:solidFill>
+              </a:rPr>
+              <a:t>and no play makes Jack a dull boy</a:t>
+            </a:r>
+            <a:endParaRPr lang="en-US" sz="3200" dirty="0">
+              <a:solidFill>
+                <a:schemeClr val="accent2"/>
+              </a:solidFill>
+            </a:endParaRPr>
+          </a:p>
+        </p:txBody>
+      </p:sp>
       <p:pic>
         <p:nvPicPr>
-          <p:cNvPr id="3" name="Picture 2" descr="E:\websites\free-power-point-templates\2012\logos.png"/>
+          <p:cNvPr id="5" name="Picture 4"/>
           <p:cNvPicPr>
-            <a:picLocks noChangeAspect="1" noChangeArrowheads="1"/>
+            <a:picLocks noChangeAspect="1"/>
           </p:cNvPicPr>
           <p:nvPr/>
         </p:nvPicPr>
@@ -4575,27 +4739,44 @@
             <a:fillRect/>
           </a:stretch>
         </p:blipFill>
-        <p:spPr bwMode="auto">
+        <p:spPr>
           <a:xfrm>
-            <a:off x="3808475" y="2326213"/>
-            <a:ext cx="1463784" cy="526961"/>
+            <a:off x="0" y="1238584"/>
+            <a:ext cx="4607859" cy="2998048"/>
           </a:xfrm>
           <a:prstGeom prst="rect">
             <a:avLst/>
           </a:prstGeom>
-          <a:noFill/>
-          <a:ln>
-            <a:noFill/>
-          </a:ln>
-          <a:extLst>
-            <a:ext uri="{909E8E84-426E-40DD-AFC4-6F175D3DCCD1}">
-              <a14:hiddenFill xmlns:a14="http://schemas.microsoft.com/office/drawing/2010/main">
-                <a:solidFill>
-                  <a:srgbClr val="FFFFFF"/>
-                </a:solidFill>
-              </a14:hiddenFill>
-            </a:ext>
-          </a:extLst>
+        </p:spPr>
+      </p:pic>
+      <p:pic>
+        <p:nvPicPr>
+          <p:cNvPr id="6" name="Picture 5"/>
+          <p:cNvPicPr>
+            <a:picLocks noChangeAspect="1"/>
+          </p:cNvPicPr>
+          <p:nvPr/>
+        </p:nvPicPr>
+        <p:blipFill>
+          <a:blip r:embed="rId4" cstate="print">
+            <a:extLst>
+              <a:ext uri="{28A0092B-C50C-407E-A947-70E740481C1C}">
+                <a14:useLocalDpi xmlns:a14="http://schemas.microsoft.com/office/drawing/2010/main" val="0"/>
+              </a:ext>
+            </a:extLst>
+          </a:blip>
+          <a:stretch>
+            <a:fillRect/>
+          </a:stretch>
+        </p:blipFill>
+        <p:spPr>
+          <a:xfrm>
+            <a:off x="4505303" y="1238584"/>
+            <a:ext cx="4638697" cy="2998048"/>
+          </a:xfrm>
+          <a:prstGeom prst="rect">
+            <a:avLst/>
+          </a:prstGeom>
         </p:spPr>
       </p:pic>
     </p:spTree>
@@ -4608,6 +4789,13 @@
   <p:clrMapOvr>
     <a:masterClrMapping/>
   </p:clrMapOvr>
+  <p:timing>
+    <p:tnLst>
+      <p:par>
+        <p:cTn id="1" dur="indefinite" restart="never" nodeType="tmRoot"/>
+      </p:par>
+    </p:tnLst>
+  </p:timing>
 </p:sld>
 </file>
 

</xml_diff>